<commit_message>
updated fig 5 & 6
</commit_message>
<xml_diff>
--- a/paper/fig-ppt/maze_pv_vs_const_acc.pptx
+++ b/paper/fig-ppt/maze_pv_vs_const_acc.pptx
@@ -245,7 +245,7 @@
           <a:p>
             <a:fld id="{6BF0428C-8154-4DC9-B09E-9680D6FDEE0B}" type="datetimeFigureOut">
               <a:rPr lang="zh-CN" altLang="en-US" smtClean="0"/>
-              <a:t>2022/9/6</a:t>
+              <a:t>2022/9/7</a:t>
             </a:fld>
             <a:endParaRPr lang="zh-CN" altLang="en-US"/>
           </a:p>
@@ -415,7 +415,7 @@
           <a:p>
             <a:fld id="{6BF0428C-8154-4DC9-B09E-9680D6FDEE0B}" type="datetimeFigureOut">
               <a:rPr lang="zh-CN" altLang="en-US" smtClean="0"/>
-              <a:t>2022/9/6</a:t>
+              <a:t>2022/9/7</a:t>
             </a:fld>
             <a:endParaRPr lang="zh-CN" altLang="en-US"/>
           </a:p>
@@ -595,7 +595,7 @@
           <a:p>
             <a:fld id="{6BF0428C-8154-4DC9-B09E-9680D6FDEE0B}" type="datetimeFigureOut">
               <a:rPr lang="zh-CN" altLang="en-US" smtClean="0"/>
-              <a:t>2022/9/6</a:t>
+              <a:t>2022/9/7</a:t>
             </a:fld>
             <a:endParaRPr lang="zh-CN" altLang="en-US"/>
           </a:p>
@@ -765,7 +765,7 @@
           <a:p>
             <a:fld id="{6BF0428C-8154-4DC9-B09E-9680D6FDEE0B}" type="datetimeFigureOut">
               <a:rPr lang="zh-CN" altLang="en-US" smtClean="0"/>
-              <a:t>2022/9/6</a:t>
+              <a:t>2022/9/7</a:t>
             </a:fld>
             <a:endParaRPr lang="zh-CN" altLang="en-US"/>
           </a:p>
@@ -1011,7 +1011,7 @@
           <a:p>
             <a:fld id="{6BF0428C-8154-4DC9-B09E-9680D6FDEE0B}" type="datetimeFigureOut">
               <a:rPr lang="zh-CN" altLang="en-US" smtClean="0"/>
-              <a:t>2022/9/6</a:t>
+              <a:t>2022/9/7</a:t>
             </a:fld>
             <a:endParaRPr lang="zh-CN" altLang="en-US"/>
           </a:p>
@@ -1243,7 +1243,7 @@
           <a:p>
             <a:fld id="{6BF0428C-8154-4DC9-B09E-9680D6FDEE0B}" type="datetimeFigureOut">
               <a:rPr lang="zh-CN" altLang="en-US" smtClean="0"/>
-              <a:t>2022/9/6</a:t>
+              <a:t>2022/9/7</a:t>
             </a:fld>
             <a:endParaRPr lang="zh-CN" altLang="en-US"/>
           </a:p>
@@ -1610,7 +1610,7 @@
           <a:p>
             <a:fld id="{6BF0428C-8154-4DC9-B09E-9680D6FDEE0B}" type="datetimeFigureOut">
               <a:rPr lang="zh-CN" altLang="en-US" smtClean="0"/>
-              <a:t>2022/9/6</a:t>
+              <a:t>2022/9/7</a:t>
             </a:fld>
             <a:endParaRPr lang="zh-CN" altLang="en-US"/>
           </a:p>
@@ -1728,7 +1728,7 @@
           <a:p>
             <a:fld id="{6BF0428C-8154-4DC9-B09E-9680D6FDEE0B}" type="datetimeFigureOut">
               <a:rPr lang="zh-CN" altLang="en-US" smtClean="0"/>
-              <a:t>2022/9/6</a:t>
+              <a:t>2022/9/7</a:t>
             </a:fld>
             <a:endParaRPr lang="zh-CN" altLang="en-US"/>
           </a:p>
@@ -1823,7 +1823,7 @@
           <a:p>
             <a:fld id="{6BF0428C-8154-4DC9-B09E-9680D6FDEE0B}" type="datetimeFigureOut">
               <a:rPr lang="zh-CN" altLang="en-US" smtClean="0"/>
-              <a:t>2022/9/6</a:t>
+              <a:t>2022/9/7</a:t>
             </a:fld>
             <a:endParaRPr lang="zh-CN" altLang="en-US"/>
           </a:p>
@@ -2100,7 +2100,7 @@
           <a:p>
             <a:fld id="{6BF0428C-8154-4DC9-B09E-9680D6FDEE0B}" type="datetimeFigureOut">
               <a:rPr lang="zh-CN" altLang="en-US" smtClean="0"/>
-              <a:t>2022/9/6</a:t>
+              <a:t>2022/9/7</a:t>
             </a:fld>
             <a:endParaRPr lang="zh-CN" altLang="en-US"/>
           </a:p>
@@ -2357,7 +2357,7 @@
           <a:p>
             <a:fld id="{6BF0428C-8154-4DC9-B09E-9680D6FDEE0B}" type="datetimeFigureOut">
               <a:rPr lang="zh-CN" altLang="en-US" smtClean="0"/>
-              <a:t>2022/9/6</a:t>
+              <a:t>2022/9/7</a:t>
             </a:fld>
             <a:endParaRPr lang="zh-CN" altLang="en-US"/>
           </a:p>
@@ -2570,7 +2570,7 @@
           <a:p>
             <a:fld id="{6BF0428C-8154-4DC9-B09E-9680D6FDEE0B}" type="datetimeFigureOut">
               <a:rPr lang="zh-CN" altLang="en-US" smtClean="0"/>
-              <a:t>2022/9/6</a:t>
+              <a:t>2022/9/7</a:t>
             </a:fld>
             <a:endParaRPr lang="zh-CN" altLang="en-US"/>
           </a:p>
@@ -2977,10 +2977,10 @@
       </p:grpSpPr>
       <p:grpSp>
         <p:nvGrpSpPr>
-          <p:cNvPr id="137" name="Group 136">
+          <p:cNvPr id="6" name="Group 5">
             <a:extLst>
               <a:ext uri="{FF2B5EF4-FFF2-40B4-BE49-F238E27FC236}">
-                <a16:creationId xmlns:a16="http://schemas.microsoft.com/office/drawing/2014/main" id="{79391DCE-33B1-0471-A2A5-C5ED99E5D345}"/>
+                <a16:creationId xmlns:a16="http://schemas.microsoft.com/office/drawing/2014/main" id="{1E6A7355-95DE-FDAA-00CC-0C8552412FB2}"/>
               </a:ext>
             </a:extLst>
           </p:cNvPr>
@@ -2989,18 +2989,18 @@
         </p:nvGrpSpPr>
         <p:grpSpPr>
           <a:xfrm>
-            <a:off x="-15037" y="-771"/>
-            <a:ext cx="9791799" cy="3932238"/>
-            <a:chOff x="-15037" y="-771"/>
-            <a:chExt cx="9791799" cy="3932238"/>
+            <a:off x="-15037" y="91333"/>
+            <a:ext cx="9791913" cy="3932238"/>
+            <a:chOff x="-15037" y="91333"/>
+            <a:chExt cx="9791913" cy="3932238"/>
           </a:xfrm>
         </p:grpSpPr>
         <p:pic>
           <p:nvPicPr>
-            <p:cNvPr id="135" name="Picture 134">
+            <p:cNvPr id="5" name="Picture 4">
               <a:extLst>
                 <a:ext uri="{FF2B5EF4-FFF2-40B4-BE49-F238E27FC236}">
-                  <a16:creationId xmlns:a16="http://schemas.microsoft.com/office/drawing/2014/main" id="{5B91E536-9336-365A-FAC0-CAC991BD4A74}"/>
+                  <a16:creationId xmlns:a16="http://schemas.microsoft.com/office/drawing/2014/main" id="{2D78456D-3791-ADF5-01AE-96978166D7D2}"/>
                 </a:ext>
               </a:extLst>
             </p:cNvPr>
@@ -3017,7 +3017,7 @@
           </p:blipFill>
           <p:spPr>
             <a:xfrm>
-              <a:off x="4533778" y="-771"/>
+              <a:off x="4533892" y="91333"/>
               <a:ext cx="5242984" cy="3932238"/>
             </a:xfrm>
             <a:prstGeom prst="rect">
@@ -3027,10 +3027,10 @@
         </p:pic>
         <p:grpSp>
           <p:nvGrpSpPr>
-            <p:cNvPr id="133" name="Group 132">
+            <p:cNvPr id="131" name="Group 130">
               <a:extLst>
                 <a:ext uri="{FF2B5EF4-FFF2-40B4-BE49-F238E27FC236}">
-                  <a16:creationId xmlns:a16="http://schemas.microsoft.com/office/drawing/2014/main" id="{CDFFF2DF-3F46-3EED-5CD1-3568ED75480A}"/>
+                  <a16:creationId xmlns:a16="http://schemas.microsoft.com/office/drawing/2014/main" id="{A1F8D1BF-C7FD-0ED5-262B-63AF16324356}"/>
                 </a:ext>
               </a:extLst>
             </p:cNvPr>
@@ -3039,798 +3039,18 @@
           </p:nvGrpSpPr>
           <p:grpSpPr>
             <a:xfrm>
-              <a:off x="-15037" y="14542"/>
-              <a:ext cx="9632112" cy="3659670"/>
-              <a:chOff x="-72187" y="5017"/>
-              <a:chExt cx="9632112" cy="3659670"/>
+              <a:off x="5171350" y="139802"/>
+              <a:ext cx="4445725" cy="3445262"/>
+              <a:chOff x="5228500" y="5017"/>
+              <a:chExt cx="4445725" cy="3445262"/>
             </a:xfrm>
           </p:grpSpPr>
-          <p:grpSp>
-            <p:nvGrpSpPr>
-              <p:cNvPr id="131" name="Group 130">
+          <p:cxnSp>
+            <p:nvCxnSpPr>
+              <p:cNvPr id="97" name="Straight Arrow Connector 96">
                 <a:extLst>
                   <a:ext uri="{FF2B5EF4-FFF2-40B4-BE49-F238E27FC236}">
-                    <a16:creationId xmlns:a16="http://schemas.microsoft.com/office/drawing/2014/main" id="{A1F8D1BF-C7FD-0ED5-262B-63AF16324356}"/>
-                  </a:ext>
-                </a:extLst>
-              </p:cNvPr>
-              <p:cNvGrpSpPr/>
-              <p:nvPr/>
-            </p:nvGrpSpPr>
-            <p:grpSpPr>
-              <a:xfrm>
-                <a:off x="5114200" y="5017"/>
-                <a:ext cx="4445725" cy="3445262"/>
-                <a:chOff x="5228500" y="5017"/>
-                <a:chExt cx="4445725" cy="3445262"/>
-              </a:xfrm>
-            </p:grpSpPr>
-            <p:cxnSp>
-              <p:nvCxnSpPr>
-                <p:cNvPr id="97" name="Straight Arrow Connector 96">
-                  <a:extLst>
-                    <a:ext uri="{FF2B5EF4-FFF2-40B4-BE49-F238E27FC236}">
-                      <a16:creationId xmlns:a16="http://schemas.microsoft.com/office/drawing/2014/main" id="{EB5C963A-94C1-7618-1556-E0172E1B1C35}"/>
-                    </a:ext>
-                  </a:extLst>
-                </p:cNvPr>
-                <p:cNvCxnSpPr>
-                  <a:cxnSpLocks/>
-                </p:cNvCxnSpPr>
-                <p:nvPr/>
-              </p:nvCxnSpPr>
-              <p:spPr>
-                <a:xfrm flipV="1">
-                  <a:off x="5276438" y="5017"/>
-                  <a:ext cx="0" cy="3419633"/>
-                </a:xfrm>
-                <a:prstGeom prst="straightConnector1">
-                  <a:avLst/>
-                </a:prstGeom>
-                <a:ln w="19050">
-                  <a:solidFill>
-                    <a:schemeClr val="tx1"/>
-                  </a:solidFill>
-                  <a:tailEnd type="triangle"/>
-                </a:ln>
-              </p:spPr>
-              <p:style>
-                <a:lnRef idx="1">
-                  <a:schemeClr val="accent1"/>
-                </a:lnRef>
-                <a:fillRef idx="0">
-                  <a:schemeClr val="accent1"/>
-                </a:fillRef>
-                <a:effectRef idx="0">
-                  <a:schemeClr val="accent1"/>
-                </a:effectRef>
-                <a:fontRef idx="minor">
-                  <a:schemeClr val="tx1"/>
-                </a:fontRef>
-              </p:style>
-            </p:cxnSp>
-            <p:cxnSp>
-              <p:nvCxnSpPr>
-                <p:cNvPr id="98" name="Straight Arrow Connector 97">
-                  <a:extLst>
-                    <a:ext uri="{FF2B5EF4-FFF2-40B4-BE49-F238E27FC236}">
-                      <a16:creationId xmlns:a16="http://schemas.microsoft.com/office/drawing/2014/main" id="{EEECD273-26DE-D1F2-4E8B-5269A57D8126}"/>
-                    </a:ext>
-                  </a:extLst>
-                </p:cNvPr>
-                <p:cNvCxnSpPr>
-                  <a:cxnSpLocks/>
-                </p:cNvCxnSpPr>
-                <p:nvPr/>
-              </p:nvCxnSpPr>
-              <p:spPr>
-                <a:xfrm flipV="1">
-                  <a:off x="5276438" y="1858423"/>
-                  <a:ext cx="0" cy="1591856"/>
-                </a:xfrm>
-                <a:prstGeom prst="straightConnector1">
-                  <a:avLst/>
-                </a:prstGeom>
-                <a:ln w="19050">
-                  <a:solidFill>
-                    <a:schemeClr val="tx1"/>
-                  </a:solidFill>
-                  <a:tailEnd type="triangle"/>
-                </a:ln>
-              </p:spPr>
-              <p:style>
-                <a:lnRef idx="1">
-                  <a:schemeClr val="accent1"/>
-                </a:lnRef>
-                <a:fillRef idx="0">
-                  <a:schemeClr val="accent1"/>
-                </a:fillRef>
-                <a:effectRef idx="0">
-                  <a:schemeClr val="accent1"/>
-                </a:effectRef>
-                <a:fontRef idx="minor">
-                  <a:schemeClr val="tx1"/>
-                </a:fontRef>
-              </p:style>
-            </p:cxnSp>
-            <p:cxnSp>
-              <p:nvCxnSpPr>
-                <p:cNvPr id="99" name="Straight Arrow Connector 98">
-                  <a:extLst>
-                    <a:ext uri="{FF2B5EF4-FFF2-40B4-BE49-F238E27FC236}">
-                      <a16:creationId xmlns:a16="http://schemas.microsoft.com/office/drawing/2014/main" id="{3D26DBEC-3B5D-02CA-F558-DBA23D188478}"/>
-                    </a:ext>
-                  </a:extLst>
-                </p:cNvPr>
-                <p:cNvCxnSpPr>
-                  <a:cxnSpLocks/>
-                </p:cNvCxnSpPr>
-                <p:nvPr/>
-              </p:nvCxnSpPr>
-              <p:spPr>
-                <a:xfrm>
-                  <a:off x="5276438" y="3450279"/>
-                  <a:ext cx="4397787" cy="0"/>
-                </a:xfrm>
-                <a:prstGeom prst="straightConnector1">
-                  <a:avLst/>
-                </a:prstGeom>
-                <a:ln w="19050">
-                  <a:solidFill>
-                    <a:schemeClr val="tx1"/>
-                  </a:solidFill>
-                  <a:tailEnd type="triangle"/>
-                </a:ln>
-              </p:spPr>
-              <p:style>
-                <a:lnRef idx="1">
-                  <a:schemeClr val="accent1"/>
-                </a:lnRef>
-                <a:fillRef idx="0">
-                  <a:schemeClr val="accent1"/>
-                </a:fillRef>
-                <a:effectRef idx="0">
-                  <a:schemeClr val="accent1"/>
-                </a:effectRef>
-                <a:fontRef idx="minor">
-                  <a:schemeClr val="tx1"/>
-                </a:fontRef>
-              </p:style>
-            </p:cxnSp>
-            <p:sp>
-              <p:nvSpPr>
-                <p:cNvPr id="122" name="TextBox 121">
-                  <a:extLst>
-                    <a:ext uri="{FF2B5EF4-FFF2-40B4-BE49-F238E27FC236}">
-                      <a16:creationId xmlns:a16="http://schemas.microsoft.com/office/drawing/2014/main" id="{A538D187-11D2-C488-6455-D3B0967A211D}"/>
-                    </a:ext>
-                  </a:extLst>
-                </p:cNvPr>
-                <p:cNvSpPr txBox="1"/>
-                <p:nvPr/>
-              </p:nvSpPr>
-              <p:spPr>
-                <a:xfrm>
-                  <a:off x="5228500" y="43002"/>
-                  <a:ext cx="403566" cy="307777"/>
-                </a:xfrm>
-                <a:prstGeom prst="rect">
-                  <a:avLst/>
-                </a:prstGeom>
-                <a:noFill/>
-              </p:spPr>
-              <p:txBody>
-                <a:bodyPr wrap="square" rtlCol="0">
-                  <a:spAutoFit/>
-                </a:bodyPr>
-                <a:lstStyle/>
-                <a:p>
-                  <a:pPr algn="ctr"/>
-                  <a:r>
-                    <a:rPr lang="en-US" sz="1400" b="1" dirty="0"/>
-                    <a:t>(c)</a:t>
-                  </a:r>
-                </a:p>
-              </p:txBody>
-            </p:sp>
-            <p:sp>
-              <p:nvSpPr>
-                <p:cNvPr id="123" name="TextBox 122">
-                  <a:extLst>
-                    <a:ext uri="{FF2B5EF4-FFF2-40B4-BE49-F238E27FC236}">
-                      <a16:creationId xmlns:a16="http://schemas.microsoft.com/office/drawing/2014/main" id="{AAD3A5FB-78EA-7449-DC6C-835B7A5112E6}"/>
-                    </a:ext>
-                  </a:extLst>
-                </p:cNvPr>
-                <p:cNvSpPr txBox="1"/>
-                <p:nvPr/>
-              </p:nvSpPr>
-              <p:spPr>
-                <a:xfrm>
-                  <a:off x="5228500" y="1931988"/>
-                  <a:ext cx="403566" cy="307777"/>
-                </a:xfrm>
-                <a:prstGeom prst="rect">
-                  <a:avLst/>
-                </a:prstGeom>
-                <a:noFill/>
-              </p:spPr>
-              <p:txBody>
-                <a:bodyPr wrap="square" rtlCol="0">
-                  <a:spAutoFit/>
-                </a:bodyPr>
-                <a:lstStyle/>
-                <a:p>
-                  <a:pPr algn="ctr"/>
-                  <a:r>
-                    <a:rPr lang="en-US" sz="1400" b="1" dirty="0"/>
-                    <a:t>(d)</a:t>
-                  </a:r>
-                </a:p>
-              </p:txBody>
-            </p:sp>
-          </p:grpSp>
-          <p:pic>
-            <p:nvPicPr>
-              <p:cNvPr id="126" name="Picture 125">
-                <a:extLst>
-                  <a:ext uri="{FF2B5EF4-FFF2-40B4-BE49-F238E27FC236}">
-                    <a16:creationId xmlns:a16="http://schemas.microsoft.com/office/drawing/2014/main" id="{5EF50E7C-675F-6CFA-24C5-71051F97E0F1}"/>
-                  </a:ext>
-                </a:extLst>
-              </p:cNvPr>
-              <p:cNvPicPr>
-                <a:picLocks noChangeAspect="1"/>
-              </p:cNvPicPr>
-              <p:nvPr/>
-            </p:nvPicPr>
-            <p:blipFill rotWithShape="1">
-              <a:blip r:embed="rId3"/>
-              <a:srcRect l="12597" t="27840" r="8822" b="44954"/>
-              <a:stretch/>
-            </p:blipFill>
-            <p:spPr>
-              <a:xfrm>
-                <a:off x="280490" y="418456"/>
-                <a:ext cx="4120038" cy="1069789"/>
-              </a:xfrm>
-              <a:prstGeom prst="rect">
-                <a:avLst/>
-              </a:prstGeom>
-            </p:spPr>
-          </p:pic>
-          <p:pic>
-            <p:nvPicPr>
-              <p:cNvPr id="129" name="Picture 128">
-                <a:extLst>
-                  <a:ext uri="{FF2B5EF4-FFF2-40B4-BE49-F238E27FC236}">
-                    <a16:creationId xmlns:a16="http://schemas.microsoft.com/office/drawing/2014/main" id="{1CE19705-6917-972E-41CD-4E26021DEE8F}"/>
-                  </a:ext>
-                </a:extLst>
-              </p:cNvPr>
-              <p:cNvPicPr>
-                <a:picLocks noChangeAspect="1"/>
-              </p:cNvPicPr>
-              <p:nvPr/>
-            </p:nvPicPr>
-            <p:blipFill rotWithShape="1">
-              <a:blip r:embed="rId4"/>
-              <a:srcRect l="12085" t="27841" r="7102" b="40412"/>
-              <a:stretch/>
-            </p:blipFill>
-            <p:spPr>
-              <a:xfrm>
-                <a:off x="258552" y="2023404"/>
-                <a:ext cx="4237021" cy="1248386"/>
-              </a:xfrm>
-              <a:prstGeom prst="rect">
-                <a:avLst/>
-              </a:prstGeom>
-            </p:spPr>
-          </p:pic>
-          <p:grpSp>
-            <p:nvGrpSpPr>
-              <p:cNvPr id="91" name="Group 90">
-                <a:extLst>
-                  <a:ext uri="{FF2B5EF4-FFF2-40B4-BE49-F238E27FC236}">
-                    <a16:creationId xmlns:a16="http://schemas.microsoft.com/office/drawing/2014/main" id="{0EF9E55C-B962-74CF-A9F6-B39B4D0D8AD3}"/>
-                  </a:ext>
-                </a:extLst>
-              </p:cNvPr>
-              <p:cNvGrpSpPr/>
-              <p:nvPr/>
-            </p:nvGrpSpPr>
-            <p:grpSpPr>
-              <a:xfrm>
-                <a:off x="-72187" y="460733"/>
-                <a:ext cx="4425090" cy="1256036"/>
-                <a:chOff x="1009106" y="2350442"/>
-                <a:chExt cx="4425090" cy="1256036"/>
-              </a:xfrm>
-            </p:grpSpPr>
-            <p:cxnSp>
-              <p:nvCxnSpPr>
-                <p:cNvPr id="105" name="直接连接符 90">
-                  <a:extLst>
-                    <a:ext uri="{FF2B5EF4-FFF2-40B4-BE49-F238E27FC236}">
-                      <a16:creationId xmlns:a16="http://schemas.microsoft.com/office/drawing/2014/main" id="{1B821BA8-9214-B59C-5DE2-56AF63B9B9DB}"/>
-                    </a:ext>
-                  </a:extLst>
-                </p:cNvPr>
-                <p:cNvCxnSpPr>
-                  <a:cxnSpLocks/>
-                </p:cNvCxnSpPr>
-                <p:nvPr/>
-              </p:nvCxnSpPr>
-              <p:spPr>
-                <a:xfrm>
-                  <a:off x="1176483" y="3350777"/>
-                  <a:ext cx="213541" cy="0"/>
-                </a:xfrm>
-                <a:prstGeom prst="line">
-                  <a:avLst/>
-                </a:prstGeom>
-                <a:ln w="19050">
-                  <a:solidFill>
-                    <a:schemeClr val="tx1"/>
-                  </a:solidFill>
-                </a:ln>
-              </p:spPr>
-              <p:style>
-                <a:lnRef idx="1">
-                  <a:schemeClr val="accent1"/>
-                </a:lnRef>
-                <a:fillRef idx="0">
-                  <a:schemeClr val="accent1"/>
-                </a:fillRef>
-                <a:effectRef idx="0">
-                  <a:schemeClr val="accent1"/>
-                </a:effectRef>
-                <a:fontRef idx="minor">
-                  <a:schemeClr val="tx1"/>
-                </a:fontRef>
-              </p:style>
-            </p:cxnSp>
-            <p:cxnSp>
-              <p:nvCxnSpPr>
-                <p:cNvPr id="106" name="直接连接符 91">
-                  <a:extLst>
-                    <a:ext uri="{FF2B5EF4-FFF2-40B4-BE49-F238E27FC236}">
-                      <a16:creationId xmlns:a16="http://schemas.microsoft.com/office/drawing/2014/main" id="{9EE15A55-A844-83F8-1B5A-AA7EB94A6895}"/>
-                    </a:ext>
-                  </a:extLst>
-                </p:cNvPr>
-                <p:cNvCxnSpPr>
-                  <a:cxnSpLocks/>
-                </p:cNvCxnSpPr>
-                <p:nvPr/>
-              </p:nvCxnSpPr>
-              <p:spPr>
-                <a:xfrm>
-                  <a:off x="1176483" y="2350442"/>
-                  <a:ext cx="213541" cy="0"/>
-                </a:xfrm>
-                <a:prstGeom prst="line">
-                  <a:avLst/>
-                </a:prstGeom>
-                <a:ln w="19050">
-                  <a:solidFill>
-                    <a:schemeClr val="tx1"/>
-                  </a:solidFill>
-                </a:ln>
-              </p:spPr>
-              <p:style>
-                <a:lnRef idx="1">
-                  <a:schemeClr val="accent1"/>
-                </a:lnRef>
-                <a:fillRef idx="0">
-                  <a:schemeClr val="accent1"/>
-                </a:fillRef>
-                <a:effectRef idx="0">
-                  <a:schemeClr val="accent1"/>
-                </a:effectRef>
-                <a:fontRef idx="minor">
-                  <a:schemeClr val="tx1"/>
-                </a:fontRef>
-              </p:style>
-            </p:cxnSp>
-            <p:cxnSp>
-              <p:nvCxnSpPr>
-                <p:cNvPr id="107" name="直接连接符 92">
-                  <a:extLst>
-                    <a:ext uri="{FF2B5EF4-FFF2-40B4-BE49-F238E27FC236}">
-                      <a16:creationId xmlns:a16="http://schemas.microsoft.com/office/drawing/2014/main" id="{51CF58F2-E050-B154-1ACA-80FB60BE5DB5}"/>
-                    </a:ext>
-                  </a:extLst>
-                </p:cNvPr>
-                <p:cNvCxnSpPr>
-                  <a:cxnSpLocks/>
-                </p:cNvCxnSpPr>
-                <p:nvPr/>
-              </p:nvCxnSpPr>
-              <p:spPr>
-                <a:xfrm flipV="1">
-                  <a:off x="1297795" y="2359773"/>
-                  <a:ext cx="0" cy="972342"/>
-                </a:xfrm>
-                <a:prstGeom prst="line">
-                  <a:avLst/>
-                </a:prstGeom>
-                <a:ln w="19050">
-                  <a:solidFill>
-                    <a:schemeClr val="tx1"/>
-                  </a:solidFill>
-                  <a:headEnd type="stealth"/>
-                  <a:tailEnd type="stealth"/>
-                </a:ln>
-              </p:spPr>
-              <p:style>
-                <a:lnRef idx="1">
-                  <a:schemeClr val="accent1"/>
-                </a:lnRef>
-                <a:fillRef idx="0">
-                  <a:schemeClr val="accent1"/>
-                </a:fillRef>
-                <a:effectRef idx="0">
-                  <a:schemeClr val="accent1"/>
-                </a:effectRef>
-                <a:fontRef idx="minor">
-                  <a:schemeClr val="tx1"/>
-                </a:fontRef>
-              </p:style>
-            </p:cxnSp>
-            <p:sp>
-              <p:nvSpPr>
-                <p:cNvPr id="108" name="文本框 9">
-                  <a:extLst>
-                    <a:ext uri="{FF2B5EF4-FFF2-40B4-BE49-F238E27FC236}">
-                      <a16:creationId xmlns:a16="http://schemas.microsoft.com/office/drawing/2014/main" id="{5C143A54-A46A-8742-545E-97B9F1EC0B82}"/>
-                    </a:ext>
-                  </a:extLst>
-                </p:cNvPr>
-                <p:cNvSpPr txBox="1"/>
-                <p:nvPr/>
-              </p:nvSpPr>
-              <p:spPr>
-                <a:xfrm rot="16200000">
-                  <a:off x="813380" y="2657332"/>
-                  <a:ext cx="699230" cy="307777"/>
-                </a:xfrm>
-                <a:prstGeom prst="rect">
-                  <a:avLst/>
-                </a:prstGeom>
-                <a:noFill/>
-                <a:ln>
-                  <a:noFill/>
-                </a:ln>
-              </p:spPr>
-              <p:txBody>
-                <a:bodyPr wrap="none" rtlCol="0">
-                  <a:spAutoFit/>
-                </a:bodyPr>
-                <a:lstStyle/>
-                <a:p>
-                  <a:pPr algn="ctr"/>
-                  <a:r>
-                    <a:rPr lang="en-US" altLang="zh-CN" sz="1400" dirty="0">
-                      <a:cs typeface="Times New Roman" panose="02020603050405020304" pitchFamily="18" charset="0"/>
-                    </a:rPr>
-                    <a:t>26 mm</a:t>
-                  </a:r>
-                  <a:endParaRPr lang="zh-CN" altLang="en-US" sz="1400" dirty="0">
-                    <a:cs typeface="Times New Roman" panose="02020603050405020304" pitchFamily="18" charset="0"/>
-                  </a:endParaRPr>
-                </a:p>
-              </p:txBody>
-            </p:sp>
-            <p:cxnSp>
-              <p:nvCxnSpPr>
-                <p:cNvPr id="109" name="直接连接符 87">
-                  <a:extLst>
-                    <a:ext uri="{FF2B5EF4-FFF2-40B4-BE49-F238E27FC236}">
-                      <a16:creationId xmlns:a16="http://schemas.microsoft.com/office/drawing/2014/main" id="{21D478B2-C86B-AC31-857A-AD206FD4F3F3}"/>
-                    </a:ext>
-                  </a:extLst>
-                </p:cNvPr>
-                <p:cNvCxnSpPr>
-                  <a:cxnSpLocks/>
-                </p:cNvCxnSpPr>
-                <p:nvPr/>
-              </p:nvCxnSpPr>
-              <p:spPr>
-                <a:xfrm>
-                  <a:off x="5434195" y="3374022"/>
-                  <a:ext cx="1" cy="232456"/>
-                </a:xfrm>
-                <a:prstGeom prst="line">
-                  <a:avLst/>
-                </a:prstGeom>
-                <a:ln w="19050">
-                  <a:solidFill>
-                    <a:schemeClr val="tx1"/>
-                  </a:solidFill>
-                </a:ln>
-              </p:spPr>
-              <p:style>
-                <a:lnRef idx="1">
-                  <a:schemeClr val="accent1"/>
-                </a:lnRef>
-                <a:fillRef idx="0">
-                  <a:schemeClr val="accent1"/>
-                </a:fillRef>
-                <a:effectRef idx="0">
-                  <a:schemeClr val="accent1"/>
-                </a:effectRef>
-                <a:fontRef idx="minor">
-                  <a:schemeClr val="tx1"/>
-                </a:fontRef>
-              </p:style>
-            </p:cxnSp>
-            <p:cxnSp>
-              <p:nvCxnSpPr>
-                <p:cNvPr id="110" name="直接连接符 88">
-                  <a:extLst>
-                    <a:ext uri="{FF2B5EF4-FFF2-40B4-BE49-F238E27FC236}">
-                      <a16:creationId xmlns:a16="http://schemas.microsoft.com/office/drawing/2014/main" id="{38A14D88-798D-404B-CA29-9E4EFEBFCF6F}"/>
-                    </a:ext>
-                  </a:extLst>
-                </p:cNvPr>
-                <p:cNvCxnSpPr>
-                  <a:cxnSpLocks/>
-                </p:cNvCxnSpPr>
-                <p:nvPr/>
-              </p:nvCxnSpPr>
-              <p:spPr>
-                <a:xfrm>
-                  <a:off x="1400557" y="3522881"/>
-                  <a:ext cx="4005635" cy="0"/>
-                </a:xfrm>
-                <a:prstGeom prst="line">
-                  <a:avLst/>
-                </a:prstGeom>
-                <a:ln w="19050">
-                  <a:solidFill>
-                    <a:schemeClr val="tx1"/>
-                  </a:solidFill>
-                  <a:headEnd type="stealth"/>
-                  <a:tailEnd type="stealth"/>
-                </a:ln>
-              </p:spPr>
-              <p:style>
-                <a:lnRef idx="1">
-                  <a:schemeClr val="accent1"/>
-                </a:lnRef>
-                <a:fillRef idx="0">
-                  <a:schemeClr val="accent1"/>
-                </a:fillRef>
-                <a:effectRef idx="0">
-                  <a:schemeClr val="accent1"/>
-                </a:effectRef>
-                <a:fontRef idx="minor">
-                  <a:schemeClr val="tx1"/>
-                </a:fontRef>
-              </p:style>
-            </p:cxnSp>
-            <p:sp>
-              <p:nvSpPr>
-                <p:cNvPr id="111" name="文本框 9">
-                  <a:extLst>
-                    <a:ext uri="{FF2B5EF4-FFF2-40B4-BE49-F238E27FC236}">
-                      <a16:creationId xmlns:a16="http://schemas.microsoft.com/office/drawing/2014/main" id="{9EFECF73-3F00-3A54-DAEF-FA04014EEADE}"/>
-                    </a:ext>
-                  </a:extLst>
-                </p:cNvPr>
-                <p:cNvSpPr txBox="1"/>
-                <p:nvPr/>
-              </p:nvSpPr>
-              <p:spPr>
-                <a:xfrm>
-                  <a:off x="3137805" y="3284442"/>
-                  <a:ext cx="784189" cy="307777"/>
-                </a:xfrm>
-                <a:prstGeom prst="rect">
-                  <a:avLst/>
-                </a:prstGeom>
-                <a:noFill/>
-                <a:ln>
-                  <a:noFill/>
-                </a:ln>
-              </p:spPr>
-              <p:txBody>
-                <a:bodyPr wrap="none" rtlCol="0">
-                  <a:spAutoFit/>
-                </a:bodyPr>
-                <a:lstStyle/>
-                <a:p>
-                  <a:pPr algn="ctr"/>
-                  <a:r>
-                    <a:rPr lang="en-US" altLang="zh-CN" sz="1400" dirty="0">
-                      <a:cs typeface="Times New Roman" panose="02020603050405020304" pitchFamily="18" charset="0"/>
-                    </a:rPr>
-                    <a:t>102 mm</a:t>
-                  </a:r>
-                  <a:endParaRPr lang="zh-CN" altLang="en-US" sz="1400" dirty="0">
-                    <a:cs typeface="Times New Roman" panose="02020603050405020304" pitchFamily="18" charset="0"/>
-                  </a:endParaRPr>
-                </a:p>
-              </p:txBody>
-            </p:sp>
-            <p:cxnSp>
-              <p:nvCxnSpPr>
-                <p:cNvPr id="112" name="直接连接符 94">
-                  <a:extLst>
-                    <a:ext uri="{FF2B5EF4-FFF2-40B4-BE49-F238E27FC236}">
-                      <a16:creationId xmlns:a16="http://schemas.microsoft.com/office/drawing/2014/main" id="{F3EF2C10-6A10-D396-AD27-EC7A41B60908}"/>
-                    </a:ext>
-                  </a:extLst>
-                </p:cNvPr>
-                <p:cNvCxnSpPr>
-                  <a:cxnSpLocks/>
-                </p:cNvCxnSpPr>
-                <p:nvPr/>
-              </p:nvCxnSpPr>
-              <p:spPr>
-                <a:xfrm>
-                  <a:off x="1395475" y="3347611"/>
-                  <a:ext cx="1" cy="232456"/>
-                </a:xfrm>
-                <a:prstGeom prst="line">
-                  <a:avLst/>
-                </a:prstGeom>
-                <a:ln w="19050">
-                  <a:solidFill>
-                    <a:schemeClr val="tx1"/>
-                  </a:solidFill>
-                </a:ln>
-              </p:spPr>
-              <p:style>
-                <a:lnRef idx="1">
-                  <a:schemeClr val="accent1"/>
-                </a:lnRef>
-                <a:fillRef idx="0">
-                  <a:schemeClr val="accent1"/>
-                </a:fillRef>
-                <a:effectRef idx="0">
-                  <a:schemeClr val="accent1"/>
-                </a:effectRef>
-                <a:fontRef idx="minor">
-                  <a:schemeClr val="tx1"/>
-                </a:fontRef>
-              </p:style>
-            </p:cxnSp>
-          </p:grpSp>
-          <p:grpSp>
-            <p:nvGrpSpPr>
-              <p:cNvPr id="92" name="Group 91">
-                <a:extLst>
-                  <a:ext uri="{FF2B5EF4-FFF2-40B4-BE49-F238E27FC236}">
-                    <a16:creationId xmlns:a16="http://schemas.microsoft.com/office/drawing/2014/main" id="{132C3DA6-EE75-2AA3-D7B4-15ADEF2703F5}"/>
-                  </a:ext>
-                </a:extLst>
-              </p:cNvPr>
-              <p:cNvGrpSpPr/>
-              <p:nvPr/>
-            </p:nvGrpSpPr>
-            <p:grpSpPr>
-              <a:xfrm>
-                <a:off x="84705" y="3191216"/>
-                <a:ext cx="4463590" cy="320648"/>
-                <a:chOff x="559415" y="4537723"/>
-                <a:chExt cx="4463590" cy="320648"/>
-              </a:xfrm>
-            </p:grpSpPr>
-            <p:sp>
-              <p:nvSpPr>
-                <p:cNvPr id="101" name="TextBox 100">
-                  <a:extLst>
-                    <a:ext uri="{FF2B5EF4-FFF2-40B4-BE49-F238E27FC236}">
-                      <a16:creationId xmlns:a16="http://schemas.microsoft.com/office/drawing/2014/main" id="{9F1BEF91-86FC-5A75-C4B3-12457A330B4A}"/>
-                    </a:ext>
-                  </a:extLst>
-                </p:cNvPr>
-                <p:cNvSpPr txBox="1"/>
-                <p:nvPr/>
-              </p:nvSpPr>
-              <p:spPr>
-                <a:xfrm>
-                  <a:off x="559415" y="4537723"/>
-                  <a:ext cx="413896" cy="307777"/>
-                </a:xfrm>
-                <a:prstGeom prst="rect">
-                  <a:avLst/>
-                </a:prstGeom>
-                <a:noFill/>
-              </p:spPr>
-              <p:txBody>
-                <a:bodyPr wrap="none" rtlCol="0">
-                  <a:spAutoFit/>
-                </a:bodyPr>
-                <a:lstStyle/>
-                <a:p>
-                  <a:r>
-                    <a:rPr lang="en-US" sz="1400" dirty="0"/>
-                    <a:t>0.1</a:t>
-                  </a:r>
-                </a:p>
-              </p:txBody>
-            </p:sp>
-            <p:sp>
-              <p:nvSpPr>
-                <p:cNvPr id="102" name="TextBox 101">
-                  <a:extLst>
-                    <a:ext uri="{FF2B5EF4-FFF2-40B4-BE49-F238E27FC236}">
-                      <a16:creationId xmlns:a16="http://schemas.microsoft.com/office/drawing/2014/main" id="{0809C0A6-CDA2-2BB8-3188-727A208CBED3}"/>
-                    </a:ext>
-                  </a:extLst>
-                </p:cNvPr>
-                <p:cNvSpPr txBox="1"/>
-                <p:nvPr/>
-              </p:nvSpPr>
-              <p:spPr>
-                <a:xfrm>
-                  <a:off x="4609109" y="4550594"/>
-                  <a:ext cx="413896" cy="307777"/>
-                </a:xfrm>
-                <a:prstGeom prst="rect">
-                  <a:avLst/>
-                </a:prstGeom>
-                <a:noFill/>
-              </p:spPr>
-              <p:txBody>
-                <a:bodyPr wrap="none" rtlCol="0">
-                  <a:spAutoFit/>
-                </a:bodyPr>
-                <a:lstStyle/>
-                <a:p>
-                  <a:r>
-                    <a:rPr lang="en-US" sz="1400" dirty="0"/>
-                    <a:t>0.3</a:t>
-                  </a:r>
-                </a:p>
-              </p:txBody>
-            </p:sp>
-            <p:sp>
-              <p:nvSpPr>
-                <p:cNvPr id="103" name="TextBox 102">
-                  <a:extLst>
-                    <a:ext uri="{FF2B5EF4-FFF2-40B4-BE49-F238E27FC236}">
-                      <a16:creationId xmlns:a16="http://schemas.microsoft.com/office/drawing/2014/main" id="{10C7AE5D-AF56-A286-913D-BE154193F5EB}"/>
-                    </a:ext>
-                  </a:extLst>
-                </p:cNvPr>
-                <p:cNvSpPr txBox="1"/>
-                <p:nvPr/>
-              </p:nvSpPr>
-              <p:spPr>
-                <a:xfrm>
-                  <a:off x="2611321" y="4550594"/>
-                  <a:ext cx="463588" cy="307777"/>
-                </a:xfrm>
-                <a:prstGeom prst="rect">
-                  <a:avLst/>
-                </a:prstGeom>
-                <a:noFill/>
-              </p:spPr>
-              <p:txBody>
-                <a:bodyPr wrap="none" rtlCol="0">
-                  <a:spAutoFit/>
-                </a:bodyPr>
-                <a:lstStyle/>
-                <a:p>
-                  <a:r>
-                    <a:rPr lang="en-US" sz="1400" dirty="0"/>
-                    <a:t>[ s ]</a:t>
-                  </a:r>
-                </a:p>
-              </p:txBody>
-            </p:sp>
-          </p:grpSp>
-          <p:cxnSp>
-            <p:nvCxnSpPr>
-              <p:cNvPr id="93" name="Straight Connector 92">
-                <a:extLst>
-                  <a:ext uri="{FF2B5EF4-FFF2-40B4-BE49-F238E27FC236}">
-                    <a16:creationId xmlns:a16="http://schemas.microsoft.com/office/drawing/2014/main" id="{DF26EF43-2903-8973-6FE3-0E53B2317946}"/>
+                    <a16:creationId xmlns:a16="http://schemas.microsoft.com/office/drawing/2014/main" id="{EB5C963A-94C1-7618-1556-E0172E1B1C35}"/>
                   </a:ext>
                 </a:extLst>
               </p:cNvPr>
@@ -3841,25 +3061,28 @@
             </p:nvCxnSpPr>
             <p:spPr>
               <a:xfrm flipV="1">
-                <a:off x="1173021" y="127214"/>
-                <a:ext cx="3867825" cy="883339"/>
+                <a:off x="5276438" y="5017"/>
+                <a:ext cx="0" cy="3419633"/>
               </a:xfrm>
-              <a:prstGeom prst="line">
+              <a:prstGeom prst="straightConnector1">
                 <a:avLst/>
               </a:prstGeom>
               <a:ln w="19050">
-                <a:prstDash val="dashDot"/>
+                <a:solidFill>
+                  <a:schemeClr val="tx1"/>
+                </a:solidFill>
+                <a:tailEnd type="triangle"/>
               </a:ln>
             </p:spPr>
             <p:style>
               <a:lnRef idx="1">
-                <a:schemeClr val="dk1"/>
+                <a:schemeClr val="accent1"/>
               </a:lnRef>
               <a:fillRef idx="0">
-                <a:schemeClr val="dk1"/>
+                <a:schemeClr val="accent1"/>
               </a:fillRef>
               <a:effectRef idx="0">
-                <a:schemeClr val="dk1"/>
+                <a:schemeClr val="accent1"/>
               </a:effectRef>
               <a:fontRef idx="minor">
                 <a:schemeClr val="tx1"/>
@@ -3868,10 +3091,54 @@
           </p:cxnSp>
           <p:cxnSp>
             <p:nvCxnSpPr>
-              <p:cNvPr id="94" name="Straight Connector 93">
+              <p:cNvPr id="98" name="Straight Arrow Connector 97">
                 <a:extLst>
                   <a:ext uri="{FF2B5EF4-FFF2-40B4-BE49-F238E27FC236}">
-                    <a16:creationId xmlns:a16="http://schemas.microsoft.com/office/drawing/2014/main" id="{33CEE871-933E-2A02-D9A1-B925BAED0A42}"/>
+                    <a16:creationId xmlns:a16="http://schemas.microsoft.com/office/drawing/2014/main" id="{EEECD273-26DE-D1F2-4E8B-5269A57D8126}"/>
+                  </a:ext>
+                </a:extLst>
+              </p:cNvPr>
+              <p:cNvCxnSpPr>
+                <a:cxnSpLocks/>
+              </p:cNvCxnSpPr>
+              <p:nvPr/>
+            </p:nvCxnSpPr>
+            <p:spPr>
+              <a:xfrm flipV="1">
+                <a:off x="5276438" y="1858423"/>
+                <a:ext cx="0" cy="1591856"/>
+              </a:xfrm>
+              <a:prstGeom prst="straightConnector1">
+                <a:avLst/>
+              </a:prstGeom>
+              <a:ln w="19050">
+                <a:solidFill>
+                  <a:schemeClr val="tx1"/>
+                </a:solidFill>
+                <a:tailEnd type="triangle"/>
+              </a:ln>
+            </p:spPr>
+            <p:style>
+              <a:lnRef idx="1">
+                <a:schemeClr val="accent1"/>
+              </a:lnRef>
+              <a:fillRef idx="0">
+                <a:schemeClr val="accent1"/>
+              </a:fillRef>
+              <a:effectRef idx="0">
+                <a:schemeClr val="accent1"/>
+              </a:effectRef>
+              <a:fontRef idx="minor">
+                <a:schemeClr val="tx1"/>
+              </a:fontRef>
+            </p:style>
+          </p:cxnSp>
+          <p:cxnSp>
+            <p:nvCxnSpPr>
+              <p:cNvPr id="99" name="Straight Arrow Connector 98">
+                <a:extLst>
+                  <a:ext uri="{FF2B5EF4-FFF2-40B4-BE49-F238E27FC236}">
+                    <a16:creationId xmlns:a16="http://schemas.microsoft.com/office/drawing/2014/main" id="{3D26DBEC-3B5D-02CA-F558-DBA23D188478}"/>
                   </a:ext>
                 </a:extLst>
               </p:cNvPr>
@@ -3882,25 +3149,28 @@
             </p:nvCxnSpPr>
             <p:spPr>
               <a:xfrm>
-                <a:off x="883311" y="2669481"/>
-                <a:ext cx="4237021" cy="995206"/>
+                <a:off x="5276438" y="3450279"/>
+                <a:ext cx="4397787" cy="0"/>
               </a:xfrm>
-              <a:prstGeom prst="line">
+              <a:prstGeom prst="straightConnector1">
                 <a:avLst/>
               </a:prstGeom>
               <a:ln w="19050">
-                <a:prstDash val="dashDot"/>
+                <a:solidFill>
+                  <a:schemeClr val="tx1"/>
+                </a:solidFill>
+                <a:tailEnd type="triangle"/>
               </a:ln>
             </p:spPr>
             <p:style>
               <a:lnRef idx="1">
-                <a:schemeClr val="dk1"/>
+                <a:schemeClr val="accent1"/>
               </a:lnRef>
               <a:fillRef idx="0">
-                <a:schemeClr val="dk1"/>
+                <a:schemeClr val="accent1"/>
               </a:fillRef>
               <a:effectRef idx="0">
-                <a:schemeClr val="dk1"/>
+                <a:schemeClr val="accent1"/>
               </a:effectRef>
               <a:fontRef idx="minor">
                 <a:schemeClr val="tx1"/>
@@ -3909,10 +3179,10 @@
           </p:cxnSp>
           <p:sp>
             <p:nvSpPr>
-              <p:cNvPr id="95" name="TextBox 94">
+              <p:cNvPr id="122" name="TextBox 121">
                 <a:extLst>
                   <a:ext uri="{FF2B5EF4-FFF2-40B4-BE49-F238E27FC236}">
-                    <a16:creationId xmlns:a16="http://schemas.microsoft.com/office/drawing/2014/main" id="{2D0B0B66-61E1-6287-4BFD-88F6CBD26BDA}"/>
+                    <a16:creationId xmlns:a16="http://schemas.microsoft.com/office/drawing/2014/main" id="{A538D187-11D2-C488-6455-D3B0967A211D}"/>
                   </a:ext>
                 </a:extLst>
               </p:cNvPr>
@@ -3921,79 +3191,7 @@
             </p:nvSpPr>
             <p:spPr>
               <a:xfrm>
-                <a:off x="291653" y="178185"/>
-                <a:ext cx="4108873" cy="307777"/>
-              </a:xfrm>
-              <a:prstGeom prst="rect">
-                <a:avLst/>
-              </a:prstGeom>
-              <a:noFill/>
-            </p:spPr>
-            <p:txBody>
-              <a:bodyPr wrap="square" rtlCol="0">
-                <a:spAutoFit/>
-              </a:bodyPr>
-              <a:lstStyle/>
-              <a:p>
-                <a:pPr algn="ctr"/>
-                <a:r>
-                  <a:rPr lang="en-US" sz="1400" dirty="0"/>
-                  <a:t>Path up-sampled with constant acceleration </a:t>
-                </a:r>
-              </a:p>
-            </p:txBody>
-          </p:sp>
-          <p:sp>
-            <p:nvSpPr>
-              <p:cNvPr id="96" name="TextBox 95">
-                <a:extLst>
-                  <a:ext uri="{FF2B5EF4-FFF2-40B4-BE49-F238E27FC236}">
-                    <a16:creationId xmlns:a16="http://schemas.microsoft.com/office/drawing/2014/main" id="{31878FC6-CB50-E24E-57DD-EF1A836A8B3D}"/>
-                  </a:ext>
-                </a:extLst>
-              </p:cNvPr>
-              <p:cNvSpPr txBox="1"/>
-              <p:nvPr/>
-            </p:nvSpPr>
-            <p:spPr>
-              <a:xfrm>
-                <a:off x="280975" y="1778100"/>
-                <a:ext cx="4289159" cy="307777"/>
-              </a:xfrm>
-              <a:prstGeom prst="rect">
-                <a:avLst/>
-              </a:prstGeom>
-              <a:noFill/>
-            </p:spPr>
-            <p:txBody>
-              <a:bodyPr wrap="square" rtlCol="0">
-                <a:spAutoFit/>
-              </a:bodyPr>
-              <a:lstStyle/>
-              <a:p>
-                <a:pPr algn="ctr"/>
-                <a:r>
-                  <a:rPr lang="en-US" sz="1400" dirty="0"/>
-                  <a:t>Path up-sampled with PVT</a:t>
-                </a:r>
-              </a:p>
-            </p:txBody>
-          </p:sp>
-          <p:sp>
-            <p:nvSpPr>
-              <p:cNvPr id="119" name="TextBox 118">
-                <a:extLst>
-                  <a:ext uri="{FF2B5EF4-FFF2-40B4-BE49-F238E27FC236}">
-                    <a16:creationId xmlns:a16="http://schemas.microsoft.com/office/drawing/2014/main" id="{39FCF338-601E-0E48-2E84-EDFDF667D759}"/>
-                  </a:ext>
-                </a:extLst>
-              </p:cNvPr>
-              <p:cNvSpPr txBox="1"/>
-              <p:nvPr/>
-            </p:nvSpPr>
-            <p:spPr>
-              <a:xfrm>
-                <a:off x="280975" y="169918"/>
+                <a:off x="5228500" y="43002"/>
                 <a:ext cx="403566" cy="307777"/>
               </a:xfrm>
               <a:prstGeom prst="rect">
@@ -4010,17 +3208,17 @@
                 <a:pPr algn="ctr"/>
                 <a:r>
                   <a:rPr lang="en-US" sz="1400" b="1" dirty="0"/>
-                  <a:t>(a)</a:t>
+                  <a:t>(c)</a:t>
                 </a:r>
               </a:p>
             </p:txBody>
           </p:sp>
           <p:sp>
             <p:nvSpPr>
-              <p:cNvPr id="120" name="TextBox 119">
+              <p:cNvPr id="123" name="TextBox 122">
                 <a:extLst>
                   <a:ext uri="{FF2B5EF4-FFF2-40B4-BE49-F238E27FC236}">
-                    <a16:creationId xmlns:a16="http://schemas.microsoft.com/office/drawing/2014/main" id="{C0AEAB75-13CD-072D-8B66-08130EB582BB}"/>
+                    <a16:creationId xmlns:a16="http://schemas.microsoft.com/office/drawing/2014/main" id="{AAD3A5FB-78EA-7449-DC6C-835B7A5112E6}"/>
                   </a:ext>
                 </a:extLst>
               </p:cNvPr>
@@ -4029,7 +3227,7 @@
             </p:nvSpPr>
             <p:spPr>
               <a:xfrm>
-                <a:off x="280975" y="1749990"/>
+                <a:off x="5228500" y="1931988"/>
                 <a:ext cx="403566" cy="307777"/>
               </a:xfrm>
               <a:prstGeom prst="rect">
@@ -4046,12 +3244,793 @@
                 <a:pPr algn="ctr"/>
                 <a:r>
                   <a:rPr lang="en-US" sz="1400" b="1" dirty="0"/>
-                  <a:t>(b)</a:t>
+                  <a:t>(d)</a:t>
                 </a:r>
               </a:p>
             </p:txBody>
           </p:sp>
         </p:grpSp>
+        <p:pic>
+          <p:nvPicPr>
+            <p:cNvPr id="126" name="Picture 125">
+              <a:extLst>
+                <a:ext uri="{FF2B5EF4-FFF2-40B4-BE49-F238E27FC236}">
+                  <a16:creationId xmlns:a16="http://schemas.microsoft.com/office/drawing/2014/main" id="{5EF50E7C-675F-6CFA-24C5-71051F97E0F1}"/>
+                </a:ext>
+              </a:extLst>
+            </p:cNvPr>
+            <p:cNvPicPr>
+              <a:picLocks noChangeAspect="1"/>
+            </p:cNvPicPr>
+            <p:nvPr/>
+          </p:nvPicPr>
+          <p:blipFill rotWithShape="1">
+            <a:blip r:embed="rId3"/>
+            <a:srcRect l="12597" t="27840" r="8822" b="44954"/>
+            <a:stretch/>
+          </p:blipFill>
+          <p:spPr>
+            <a:xfrm>
+              <a:off x="337640" y="427981"/>
+              <a:ext cx="4120038" cy="1069789"/>
+            </a:xfrm>
+            <a:prstGeom prst="rect">
+              <a:avLst/>
+            </a:prstGeom>
+          </p:spPr>
+        </p:pic>
+        <p:pic>
+          <p:nvPicPr>
+            <p:cNvPr id="129" name="Picture 128">
+              <a:extLst>
+                <a:ext uri="{FF2B5EF4-FFF2-40B4-BE49-F238E27FC236}">
+                  <a16:creationId xmlns:a16="http://schemas.microsoft.com/office/drawing/2014/main" id="{1CE19705-6917-972E-41CD-4E26021DEE8F}"/>
+                </a:ext>
+              </a:extLst>
+            </p:cNvPr>
+            <p:cNvPicPr>
+              <a:picLocks noChangeAspect="1"/>
+            </p:cNvPicPr>
+            <p:nvPr/>
+          </p:nvPicPr>
+          <p:blipFill rotWithShape="1">
+            <a:blip r:embed="rId4"/>
+            <a:srcRect l="12085" t="27841" r="7102" b="40412"/>
+            <a:stretch/>
+          </p:blipFill>
+          <p:spPr>
+            <a:xfrm>
+              <a:off x="315702" y="2032929"/>
+              <a:ext cx="4237021" cy="1248386"/>
+            </a:xfrm>
+            <a:prstGeom prst="rect">
+              <a:avLst/>
+            </a:prstGeom>
+          </p:spPr>
+        </p:pic>
+        <p:grpSp>
+          <p:nvGrpSpPr>
+            <p:cNvPr id="91" name="Group 90">
+              <a:extLst>
+                <a:ext uri="{FF2B5EF4-FFF2-40B4-BE49-F238E27FC236}">
+                  <a16:creationId xmlns:a16="http://schemas.microsoft.com/office/drawing/2014/main" id="{0EF9E55C-B962-74CF-A9F6-B39B4D0D8AD3}"/>
+                </a:ext>
+              </a:extLst>
+            </p:cNvPr>
+            <p:cNvGrpSpPr/>
+            <p:nvPr/>
+          </p:nvGrpSpPr>
+          <p:grpSpPr>
+            <a:xfrm>
+              <a:off x="-15037" y="470258"/>
+              <a:ext cx="4425090" cy="1256036"/>
+              <a:chOff x="1009106" y="2350442"/>
+              <a:chExt cx="4425090" cy="1256036"/>
+            </a:xfrm>
+          </p:grpSpPr>
+          <p:cxnSp>
+            <p:nvCxnSpPr>
+              <p:cNvPr id="105" name="直接连接符 90">
+                <a:extLst>
+                  <a:ext uri="{FF2B5EF4-FFF2-40B4-BE49-F238E27FC236}">
+                    <a16:creationId xmlns:a16="http://schemas.microsoft.com/office/drawing/2014/main" id="{1B821BA8-9214-B59C-5DE2-56AF63B9B9DB}"/>
+                  </a:ext>
+                </a:extLst>
+              </p:cNvPr>
+              <p:cNvCxnSpPr>
+                <a:cxnSpLocks/>
+              </p:cNvCxnSpPr>
+              <p:nvPr/>
+            </p:nvCxnSpPr>
+            <p:spPr>
+              <a:xfrm>
+                <a:off x="1176483" y="3350777"/>
+                <a:ext cx="213541" cy="0"/>
+              </a:xfrm>
+              <a:prstGeom prst="line">
+                <a:avLst/>
+              </a:prstGeom>
+              <a:ln w="19050">
+                <a:solidFill>
+                  <a:schemeClr val="tx1"/>
+                </a:solidFill>
+              </a:ln>
+            </p:spPr>
+            <p:style>
+              <a:lnRef idx="1">
+                <a:schemeClr val="accent1"/>
+              </a:lnRef>
+              <a:fillRef idx="0">
+                <a:schemeClr val="accent1"/>
+              </a:fillRef>
+              <a:effectRef idx="0">
+                <a:schemeClr val="accent1"/>
+              </a:effectRef>
+              <a:fontRef idx="minor">
+                <a:schemeClr val="tx1"/>
+              </a:fontRef>
+            </p:style>
+          </p:cxnSp>
+          <p:cxnSp>
+            <p:nvCxnSpPr>
+              <p:cNvPr id="106" name="直接连接符 91">
+                <a:extLst>
+                  <a:ext uri="{FF2B5EF4-FFF2-40B4-BE49-F238E27FC236}">
+                    <a16:creationId xmlns:a16="http://schemas.microsoft.com/office/drawing/2014/main" id="{9EE15A55-A844-83F8-1B5A-AA7EB94A6895}"/>
+                  </a:ext>
+                </a:extLst>
+              </p:cNvPr>
+              <p:cNvCxnSpPr>
+                <a:cxnSpLocks/>
+              </p:cNvCxnSpPr>
+              <p:nvPr/>
+            </p:nvCxnSpPr>
+            <p:spPr>
+              <a:xfrm>
+                <a:off x="1176483" y="2350442"/>
+                <a:ext cx="213541" cy="0"/>
+              </a:xfrm>
+              <a:prstGeom prst="line">
+                <a:avLst/>
+              </a:prstGeom>
+              <a:ln w="19050">
+                <a:solidFill>
+                  <a:schemeClr val="tx1"/>
+                </a:solidFill>
+              </a:ln>
+            </p:spPr>
+            <p:style>
+              <a:lnRef idx="1">
+                <a:schemeClr val="accent1"/>
+              </a:lnRef>
+              <a:fillRef idx="0">
+                <a:schemeClr val="accent1"/>
+              </a:fillRef>
+              <a:effectRef idx="0">
+                <a:schemeClr val="accent1"/>
+              </a:effectRef>
+              <a:fontRef idx="minor">
+                <a:schemeClr val="tx1"/>
+              </a:fontRef>
+            </p:style>
+          </p:cxnSp>
+          <p:cxnSp>
+            <p:nvCxnSpPr>
+              <p:cNvPr id="107" name="直接连接符 92">
+                <a:extLst>
+                  <a:ext uri="{FF2B5EF4-FFF2-40B4-BE49-F238E27FC236}">
+                    <a16:creationId xmlns:a16="http://schemas.microsoft.com/office/drawing/2014/main" id="{51CF58F2-E050-B154-1ACA-80FB60BE5DB5}"/>
+                  </a:ext>
+                </a:extLst>
+              </p:cNvPr>
+              <p:cNvCxnSpPr>
+                <a:cxnSpLocks/>
+              </p:cNvCxnSpPr>
+              <p:nvPr/>
+            </p:nvCxnSpPr>
+            <p:spPr>
+              <a:xfrm flipV="1">
+                <a:off x="1297795" y="2359773"/>
+                <a:ext cx="0" cy="972342"/>
+              </a:xfrm>
+              <a:prstGeom prst="line">
+                <a:avLst/>
+              </a:prstGeom>
+              <a:ln w="19050">
+                <a:solidFill>
+                  <a:schemeClr val="tx1"/>
+                </a:solidFill>
+                <a:headEnd type="stealth"/>
+                <a:tailEnd type="stealth"/>
+              </a:ln>
+            </p:spPr>
+            <p:style>
+              <a:lnRef idx="1">
+                <a:schemeClr val="accent1"/>
+              </a:lnRef>
+              <a:fillRef idx="0">
+                <a:schemeClr val="accent1"/>
+              </a:fillRef>
+              <a:effectRef idx="0">
+                <a:schemeClr val="accent1"/>
+              </a:effectRef>
+              <a:fontRef idx="minor">
+                <a:schemeClr val="tx1"/>
+              </a:fontRef>
+            </p:style>
+          </p:cxnSp>
+          <p:sp>
+            <p:nvSpPr>
+              <p:cNvPr id="108" name="文本框 9">
+                <a:extLst>
+                  <a:ext uri="{FF2B5EF4-FFF2-40B4-BE49-F238E27FC236}">
+                    <a16:creationId xmlns:a16="http://schemas.microsoft.com/office/drawing/2014/main" id="{5C143A54-A46A-8742-545E-97B9F1EC0B82}"/>
+                  </a:ext>
+                </a:extLst>
+              </p:cNvPr>
+              <p:cNvSpPr txBox="1"/>
+              <p:nvPr/>
+            </p:nvSpPr>
+            <p:spPr>
+              <a:xfrm rot="16200000">
+                <a:off x="813380" y="2657332"/>
+                <a:ext cx="699230" cy="307777"/>
+              </a:xfrm>
+              <a:prstGeom prst="rect">
+                <a:avLst/>
+              </a:prstGeom>
+              <a:noFill/>
+              <a:ln>
+                <a:noFill/>
+              </a:ln>
+            </p:spPr>
+            <p:txBody>
+              <a:bodyPr wrap="none" rtlCol="0">
+                <a:spAutoFit/>
+              </a:bodyPr>
+              <a:lstStyle/>
+              <a:p>
+                <a:pPr algn="ctr"/>
+                <a:r>
+                  <a:rPr lang="en-US" altLang="zh-CN" sz="1400" dirty="0">
+                    <a:cs typeface="Times New Roman" panose="02020603050405020304" pitchFamily="18" charset="0"/>
+                  </a:rPr>
+                  <a:t>26 mm</a:t>
+                </a:r>
+                <a:endParaRPr lang="zh-CN" altLang="en-US" sz="1400" dirty="0">
+                  <a:cs typeface="Times New Roman" panose="02020603050405020304" pitchFamily="18" charset="0"/>
+                </a:endParaRPr>
+              </a:p>
+            </p:txBody>
+          </p:sp>
+          <p:cxnSp>
+            <p:nvCxnSpPr>
+              <p:cNvPr id="109" name="直接连接符 87">
+                <a:extLst>
+                  <a:ext uri="{FF2B5EF4-FFF2-40B4-BE49-F238E27FC236}">
+                    <a16:creationId xmlns:a16="http://schemas.microsoft.com/office/drawing/2014/main" id="{21D478B2-C86B-AC31-857A-AD206FD4F3F3}"/>
+                  </a:ext>
+                </a:extLst>
+              </p:cNvPr>
+              <p:cNvCxnSpPr>
+                <a:cxnSpLocks/>
+              </p:cNvCxnSpPr>
+              <p:nvPr/>
+            </p:nvCxnSpPr>
+            <p:spPr>
+              <a:xfrm>
+                <a:off x="5434195" y="3374022"/>
+                <a:ext cx="1" cy="232456"/>
+              </a:xfrm>
+              <a:prstGeom prst="line">
+                <a:avLst/>
+              </a:prstGeom>
+              <a:ln w="19050">
+                <a:solidFill>
+                  <a:schemeClr val="tx1"/>
+                </a:solidFill>
+              </a:ln>
+            </p:spPr>
+            <p:style>
+              <a:lnRef idx="1">
+                <a:schemeClr val="accent1"/>
+              </a:lnRef>
+              <a:fillRef idx="0">
+                <a:schemeClr val="accent1"/>
+              </a:fillRef>
+              <a:effectRef idx="0">
+                <a:schemeClr val="accent1"/>
+              </a:effectRef>
+              <a:fontRef idx="minor">
+                <a:schemeClr val="tx1"/>
+              </a:fontRef>
+            </p:style>
+          </p:cxnSp>
+          <p:cxnSp>
+            <p:nvCxnSpPr>
+              <p:cNvPr id="110" name="直接连接符 88">
+                <a:extLst>
+                  <a:ext uri="{FF2B5EF4-FFF2-40B4-BE49-F238E27FC236}">
+                    <a16:creationId xmlns:a16="http://schemas.microsoft.com/office/drawing/2014/main" id="{38A14D88-798D-404B-CA29-9E4EFEBFCF6F}"/>
+                  </a:ext>
+                </a:extLst>
+              </p:cNvPr>
+              <p:cNvCxnSpPr>
+                <a:cxnSpLocks/>
+              </p:cNvCxnSpPr>
+              <p:nvPr/>
+            </p:nvCxnSpPr>
+            <p:spPr>
+              <a:xfrm>
+                <a:off x="1400557" y="3522881"/>
+                <a:ext cx="4005635" cy="0"/>
+              </a:xfrm>
+              <a:prstGeom prst="line">
+                <a:avLst/>
+              </a:prstGeom>
+              <a:ln w="19050">
+                <a:solidFill>
+                  <a:schemeClr val="tx1"/>
+                </a:solidFill>
+                <a:headEnd type="stealth"/>
+                <a:tailEnd type="stealth"/>
+              </a:ln>
+            </p:spPr>
+            <p:style>
+              <a:lnRef idx="1">
+                <a:schemeClr val="accent1"/>
+              </a:lnRef>
+              <a:fillRef idx="0">
+                <a:schemeClr val="accent1"/>
+              </a:fillRef>
+              <a:effectRef idx="0">
+                <a:schemeClr val="accent1"/>
+              </a:effectRef>
+              <a:fontRef idx="minor">
+                <a:schemeClr val="tx1"/>
+              </a:fontRef>
+            </p:style>
+          </p:cxnSp>
+          <p:sp>
+            <p:nvSpPr>
+              <p:cNvPr id="111" name="文本框 9">
+                <a:extLst>
+                  <a:ext uri="{FF2B5EF4-FFF2-40B4-BE49-F238E27FC236}">
+                    <a16:creationId xmlns:a16="http://schemas.microsoft.com/office/drawing/2014/main" id="{9EFECF73-3F00-3A54-DAEF-FA04014EEADE}"/>
+                  </a:ext>
+                </a:extLst>
+              </p:cNvPr>
+              <p:cNvSpPr txBox="1"/>
+              <p:nvPr/>
+            </p:nvSpPr>
+            <p:spPr>
+              <a:xfrm>
+                <a:off x="3137805" y="3284442"/>
+                <a:ext cx="784189" cy="307777"/>
+              </a:xfrm>
+              <a:prstGeom prst="rect">
+                <a:avLst/>
+              </a:prstGeom>
+              <a:noFill/>
+              <a:ln>
+                <a:noFill/>
+              </a:ln>
+            </p:spPr>
+            <p:txBody>
+              <a:bodyPr wrap="none" rtlCol="0">
+                <a:spAutoFit/>
+              </a:bodyPr>
+              <a:lstStyle/>
+              <a:p>
+                <a:pPr algn="ctr"/>
+                <a:r>
+                  <a:rPr lang="en-US" altLang="zh-CN" sz="1400" dirty="0">
+                    <a:cs typeface="Times New Roman" panose="02020603050405020304" pitchFamily="18" charset="0"/>
+                  </a:rPr>
+                  <a:t>102 mm</a:t>
+                </a:r>
+                <a:endParaRPr lang="zh-CN" altLang="en-US" sz="1400" dirty="0">
+                  <a:cs typeface="Times New Roman" panose="02020603050405020304" pitchFamily="18" charset="0"/>
+                </a:endParaRPr>
+              </a:p>
+            </p:txBody>
+          </p:sp>
+          <p:cxnSp>
+            <p:nvCxnSpPr>
+              <p:cNvPr id="112" name="直接连接符 94">
+                <a:extLst>
+                  <a:ext uri="{FF2B5EF4-FFF2-40B4-BE49-F238E27FC236}">
+                    <a16:creationId xmlns:a16="http://schemas.microsoft.com/office/drawing/2014/main" id="{F3EF2C10-6A10-D396-AD27-EC7A41B60908}"/>
+                  </a:ext>
+                </a:extLst>
+              </p:cNvPr>
+              <p:cNvCxnSpPr>
+                <a:cxnSpLocks/>
+              </p:cNvCxnSpPr>
+              <p:nvPr/>
+            </p:nvCxnSpPr>
+            <p:spPr>
+              <a:xfrm>
+                <a:off x="1395475" y="3347611"/>
+                <a:ext cx="1" cy="232456"/>
+              </a:xfrm>
+              <a:prstGeom prst="line">
+                <a:avLst/>
+              </a:prstGeom>
+              <a:ln w="19050">
+                <a:solidFill>
+                  <a:schemeClr val="tx1"/>
+                </a:solidFill>
+              </a:ln>
+            </p:spPr>
+            <p:style>
+              <a:lnRef idx="1">
+                <a:schemeClr val="accent1"/>
+              </a:lnRef>
+              <a:fillRef idx="0">
+                <a:schemeClr val="accent1"/>
+              </a:fillRef>
+              <a:effectRef idx="0">
+                <a:schemeClr val="accent1"/>
+              </a:effectRef>
+              <a:fontRef idx="minor">
+                <a:schemeClr val="tx1"/>
+              </a:fontRef>
+            </p:style>
+          </p:cxnSp>
+        </p:grpSp>
+        <p:grpSp>
+          <p:nvGrpSpPr>
+            <p:cNvPr id="92" name="Group 91">
+              <a:extLst>
+                <a:ext uri="{FF2B5EF4-FFF2-40B4-BE49-F238E27FC236}">
+                  <a16:creationId xmlns:a16="http://schemas.microsoft.com/office/drawing/2014/main" id="{132C3DA6-EE75-2AA3-D7B4-15ADEF2703F5}"/>
+                </a:ext>
+              </a:extLst>
+            </p:cNvPr>
+            <p:cNvGrpSpPr/>
+            <p:nvPr/>
+          </p:nvGrpSpPr>
+          <p:grpSpPr>
+            <a:xfrm>
+              <a:off x="141855" y="3200741"/>
+              <a:ext cx="4463590" cy="320648"/>
+              <a:chOff x="559415" y="4537723"/>
+              <a:chExt cx="4463590" cy="320648"/>
+            </a:xfrm>
+          </p:grpSpPr>
+          <p:sp>
+            <p:nvSpPr>
+              <p:cNvPr id="101" name="TextBox 100">
+                <a:extLst>
+                  <a:ext uri="{FF2B5EF4-FFF2-40B4-BE49-F238E27FC236}">
+                    <a16:creationId xmlns:a16="http://schemas.microsoft.com/office/drawing/2014/main" id="{9F1BEF91-86FC-5A75-C4B3-12457A330B4A}"/>
+                  </a:ext>
+                </a:extLst>
+              </p:cNvPr>
+              <p:cNvSpPr txBox="1"/>
+              <p:nvPr/>
+            </p:nvSpPr>
+            <p:spPr>
+              <a:xfrm>
+                <a:off x="559415" y="4537723"/>
+                <a:ext cx="413896" cy="307777"/>
+              </a:xfrm>
+              <a:prstGeom prst="rect">
+                <a:avLst/>
+              </a:prstGeom>
+              <a:noFill/>
+            </p:spPr>
+            <p:txBody>
+              <a:bodyPr wrap="none" rtlCol="0">
+                <a:spAutoFit/>
+              </a:bodyPr>
+              <a:lstStyle/>
+              <a:p>
+                <a:r>
+                  <a:rPr lang="en-US" sz="1400" dirty="0"/>
+                  <a:t>0.1</a:t>
+                </a:r>
+              </a:p>
+            </p:txBody>
+          </p:sp>
+          <p:sp>
+            <p:nvSpPr>
+              <p:cNvPr id="102" name="TextBox 101">
+                <a:extLst>
+                  <a:ext uri="{FF2B5EF4-FFF2-40B4-BE49-F238E27FC236}">
+                    <a16:creationId xmlns:a16="http://schemas.microsoft.com/office/drawing/2014/main" id="{0809C0A6-CDA2-2BB8-3188-727A208CBED3}"/>
+                  </a:ext>
+                </a:extLst>
+              </p:cNvPr>
+              <p:cNvSpPr txBox="1"/>
+              <p:nvPr/>
+            </p:nvSpPr>
+            <p:spPr>
+              <a:xfrm>
+                <a:off x="4609109" y="4550594"/>
+                <a:ext cx="413896" cy="307777"/>
+              </a:xfrm>
+              <a:prstGeom prst="rect">
+                <a:avLst/>
+              </a:prstGeom>
+              <a:noFill/>
+            </p:spPr>
+            <p:txBody>
+              <a:bodyPr wrap="none" rtlCol="0">
+                <a:spAutoFit/>
+              </a:bodyPr>
+              <a:lstStyle/>
+              <a:p>
+                <a:r>
+                  <a:rPr lang="en-US" sz="1400" dirty="0"/>
+                  <a:t>0.3</a:t>
+                </a:r>
+              </a:p>
+            </p:txBody>
+          </p:sp>
+          <p:sp>
+            <p:nvSpPr>
+              <p:cNvPr id="103" name="TextBox 102">
+                <a:extLst>
+                  <a:ext uri="{FF2B5EF4-FFF2-40B4-BE49-F238E27FC236}">
+                    <a16:creationId xmlns:a16="http://schemas.microsoft.com/office/drawing/2014/main" id="{10C7AE5D-AF56-A286-913D-BE154193F5EB}"/>
+                  </a:ext>
+                </a:extLst>
+              </p:cNvPr>
+              <p:cNvSpPr txBox="1"/>
+              <p:nvPr/>
+            </p:nvSpPr>
+            <p:spPr>
+              <a:xfrm>
+                <a:off x="2611321" y="4550594"/>
+                <a:ext cx="463588" cy="307777"/>
+              </a:xfrm>
+              <a:prstGeom prst="rect">
+                <a:avLst/>
+              </a:prstGeom>
+              <a:noFill/>
+            </p:spPr>
+            <p:txBody>
+              <a:bodyPr wrap="none" rtlCol="0">
+                <a:spAutoFit/>
+              </a:bodyPr>
+              <a:lstStyle/>
+              <a:p>
+                <a:r>
+                  <a:rPr lang="en-US" sz="1400" dirty="0"/>
+                  <a:t>[ s ]</a:t>
+                </a:r>
+              </a:p>
+            </p:txBody>
+          </p:sp>
+        </p:grpSp>
+        <p:cxnSp>
+          <p:nvCxnSpPr>
+            <p:cNvPr id="93" name="Straight Connector 92">
+              <a:extLst>
+                <a:ext uri="{FF2B5EF4-FFF2-40B4-BE49-F238E27FC236}">
+                  <a16:creationId xmlns:a16="http://schemas.microsoft.com/office/drawing/2014/main" id="{DF26EF43-2903-8973-6FE3-0E53B2317946}"/>
+                </a:ext>
+              </a:extLst>
+            </p:cNvPr>
+            <p:cNvCxnSpPr>
+              <a:cxnSpLocks/>
+            </p:cNvCxnSpPr>
+            <p:nvPr/>
+          </p:nvCxnSpPr>
+          <p:spPr>
+            <a:xfrm flipV="1">
+              <a:off x="1230171" y="136739"/>
+              <a:ext cx="3867825" cy="883339"/>
+            </a:xfrm>
+            <a:prstGeom prst="line">
+              <a:avLst/>
+            </a:prstGeom>
+            <a:ln w="19050">
+              <a:prstDash val="dashDot"/>
+            </a:ln>
+          </p:spPr>
+          <p:style>
+            <a:lnRef idx="1">
+              <a:schemeClr val="dk1"/>
+            </a:lnRef>
+            <a:fillRef idx="0">
+              <a:schemeClr val="dk1"/>
+            </a:fillRef>
+            <a:effectRef idx="0">
+              <a:schemeClr val="dk1"/>
+            </a:effectRef>
+            <a:fontRef idx="minor">
+              <a:schemeClr val="tx1"/>
+            </a:fontRef>
+          </p:style>
+        </p:cxnSp>
+        <p:cxnSp>
+          <p:nvCxnSpPr>
+            <p:cNvPr id="94" name="Straight Connector 93">
+              <a:extLst>
+                <a:ext uri="{FF2B5EF4-FFF2-40B4-BE49-F238E27FC236}">
+                  <a16:creationId xmlns:a16="http://schemas.microsoft.com/office/drawing/2014/main" id="{33CEE871-933E-2A02-D9A1-B925BAED0A42}"/>
+                </a:ext>
+              </a:extLst>
+            </p:cNvPr>
+            <p:cNvCxnSpPr>
+              <a:cxnSpLocks/>
+            </p:cNvCxnSpPr>
+            <p:nvPr/>
+          </p:nvCxnSpPr>
+          <p:spPr>
+            <a:xfrm>
+              <a:off x="940461" y="2679006"/>
+              <a:ext cx="4237021" cy="995206"/>
+            </a:xfrm>
+            <a:prstGeom prst="line">
+              <a:avLst/>
+            </a:prstGeom>
+            <a:ln w="19050">
+              <a:prstDash val="dashDot"/>
+            </a:ln>
+          </p:spPr>
+          <p:style>
+            <a:lnRef idx="1">
+              <a:schemeClr val="dk1"/>
+            </a:lnRef>
+            <a:fillRef idx="0">
+              <a:schemeClr val="dk1"/>
+            </a:fillRef>
+            <a:effectRef idx="0">
+              <a:schemeClr val="dk1"/>
+            </a:effectRef>
+            <a:fontRef idx="minor">
+              <a:schemeClr val="tx1"/>
+            </a:fontRef>
+          </p:style>
+        </p:cxnSp>
+        <p:sp>
+          <p:nvSpPr>
+            <p:cNvPr id="95" name="TextBox 94">
+              <a:extLst>
+                <a:ext uri="{FF2B5EF4-FFF2-40B4-BE49-F238E27FC236}">
+                  <a16:creationId xmlns:a16="http://schemas.microsoft.com/office/drawing/2014/main" id="{2D0B0B66-61E1-6287-4BFD-88F6CBD26BDA}"/>
+                </a:ext>
+              </a:extLst>
+            </p:cNvPr>
+            <p:cNvSpPr txBox="1"/>
+            <p:nvPr/>
+          </p:nvSpPr>
+          <p:spPr>
+            <a:xfrm>
+              <a:off x="348803" y="187710"/>
+              <a:ext cx="4108873" cy="307777"/>
+            </a:xfrm>
+            <a:prstGeom prst="rect">
+              <a:avLst/>
+            </a:prstGeom>
+            <a:noFill/>
+          </p:spPr>
+          <p:txBody>
+            <a:bodyPr wrap="square" rtlCol="0">
+              <a:spAutoFit/>
+            </a:bodyPr>
+            <a:lstStyle/>
+            <a:p>
+              <a:pPr algn="ctr"/>
+              <a:r>
+                <a:rPr lang="en-US" sz="1400" dirty="0"/>
+                <a:t>Path up-sampled with constant acceleration </a:t>
+              </a:r>
+            </a:p>
+          </p:txBody>
+        </p:sp>
+        <p:sp>
+          <p:nvSpPr>
+            <p:cNvPr id="96" name="TextBox 95">
+              <a:extLst>
+                <a:ext uri="{FF2B5EF4-FFF2-40B4-BE49-F238E27FC236}">
+                  <a16:creationId xmlns:a16="http://schemas.microsoft.com/office/drawing/2014/main" id="{31878FC6-CB50-E24E-57DD-EF1A836A8B3D}"/>
+                </a:ext>
+              </a:extLst>
+            </p:cNvPr>
+            <p:cNvSpPr txBox="1"/>
+            <p:nvPr/>
+          </p:nvSpPr>
+          <p:spPr>
+            <a:xfrm>
+              <a:off x="338125" y="1787625"/>
+              <a:ext cx="4289159" cy="307777"/>
+            </a:xfrm>
+            <a:prstGeom prst="rect">
+              <a:avLst/>
+            </a:prstGeom>
+            <a:noFill/>
+          </p:spPr>
+          <p:txBody>
+            <a:bodyPr wrap="square" rtlCol="0">
+              <a:spAutoFit/>
+            </a:bodyPr>
+            <a:lstStyle/>
+            <a:p>
+              <a:pPr algn="ctr"/>
+              <a:r>
+                <a:rPr lang="en-US" sz="1400" dirty="0"/>
+                <a:t>Path up-sampled with PVT</a:t>
+              </a:r>
+            </a:p>
+          </p:txBody>
+        </p:sp>
+        <p:sp>
+          <p:nvSpPr>
+            <p:cNvPr id="119" name="TextBox 118">
+              <a:extLst>
+                <a:ext uri="{FF2B5EF4-FFF2-40B4-BE49-F238E27FC236}">
+                  <a16:creationId xmlns:a16="http://schemas.microsoft.com/office/drawing/2014/main" id="{39FCF338-601E-0E48-2E84-EDFDF667D759}"/>
+                </a:ext>
+              </a:extLst>
+            </p:cNvPr>
+            <p:cNvSpPr txBox="1"/>
+            <p:nvPr/>
+          </p:nvSpPr>
+          <p:spPr>
+            <a:xfrm>
+              <a:off x="338125" y="179443"/>
+              <a:ext cx="403566" cy="307777"/>
+            </a:xfrm>
+            <a:prstGeom prst="rect">
+              <a:avLst/>
+            </a:prstGeom>
+            <a:noFill/>
+          </p:spPr>
+          <p:txBody>
+            <a:bodyPr wrap="square" rtlCol="0">
+              <a:spAutoFit/>
+            </a:bodyPr>
+            <a:lstStyle/>
+            <a:p>
+              <a:pPr algn="ctr"/>
+              <a:r>
+                <a:rPr lang="en-US" sz="1400" b="1" dirty="0"/>
+                <a:t>(a)</a:t>
+              </a:r>
+            </a:p>
+          </p:txBody>
+        </p:sp>
+        <p:sp>
+          <p:nvSpPr>
+            <p:cNvPr id="120" name="TextBox 119">
+              <a:extLst>
+                <a:ext uri="{FF2B5EF4-FFF2-40B4-BE49-F238E27FC236}">
+                  <a16:creationId xmlns:a16="http://schemas.microsoft.com/office/drawing/2014/main" id="{C0AEAB75-13CD-072D-8B66-08130EB582BB}"/>
+                </a:ext>
+              </a:extLst>
+            </p:cNvPr>
+            <p:cNvSpPr txBox="1"/>
+            <p:nvPr/>
+          </p:nvSpPr>
+          <p:spPr>
+            <a:xfrm>
+              <a:off x="338125" y="1759515"/>
+              <a:ext cx="403566" cy="307777"/>
+            </a:xfrm>
+            <a:prstGeom prst="rect">
+              <a:avLst/>
+            </a:prstGeom>
+            <a:noFill/>
+          </p:spPr>
+          <p:txBody>
+            <a:bodyPr wrap="square" rtlCol="0">
+              <a:spAutoFit/>
+            </a:bodyPr>
+            <a:lstStyle/>
+            <a:p>
+              <a:pPr algn="ctr"/>
+              <a:r>
+                <a:rPr lang="en-US" sz="1400" b="1" dirty="0"/>
+                <a:t>(b)</a:t>
+              </a:r>
+            </a:p>
+          </p:txBody>
+        </p:sp>
         <p:sp>
           <p:nvSpPr>
             <p:cNvPr id="136" name="TextBox 135">
@@ -4947,8 +4926,8 @@
           </a:p>
         </p:txBody>
       </p:sp>
-      <mc:AlternateContent xmlns:mc="http://schemas.openxmlformats.org/markup-compatibility/2006">
-        <mc:Choice xmlns:a14="http://schemas.microsoft.com/office/drawing/2010/main" Requires="a14">
+      <mc:AlternateContent xmlns:mc="http://schemas.openxmlformats.org/markup-compatibility/2006" xmlns:a14="http://schemas.microsoft.com/office/drawing/2010/main">
+        <mc:Choice Requires="a14">
           <p:sp>
             <p:nvSpPr>
               <p:cNvPr id="110" name="文本框 109">
@@ -5025,7 +5004,7 @@
             </p:txBody>
           </p:sp>
         </mc:Choice>
-        <mc:Fallback>
+        <mc:Fallback xmlns="">
           <p:sp>
             <p:nvSpPr>
               <p:cNvPr id="110" name="文本框 109">
@@ -5070,8 +5049,8 @@
           </p:sp>
         </mc:Fallback>
       </mc:AlternateContent>
-      <mc:AlternateContent xmlns:mc="http://schemas.openxmlformats.org/markup-compatibility/2006">
-        <mc:Choice xmlns:a14="http://schemas.microsoft.com/office/drawing/2010/main" Requires="a14">
+      <mc:AlternateContent xmlns:mc="http://schemas.openxmlformats.org/markup-compatibility/2006" xmlns:a14="http://schemas.microsoft.com/office/drawing/2010/main">
+        <mc:Choice Requires="a14">
           <p:sp>
             <p:nvSpPr>
               <p:cNvPr id="112" name="文本框 111">
@@ -5154,7 +5133,7 @@
             </p:txBody>
           </p:sp>
         </mc:Choice>
-        <mc:Fallback>
+        <mc:Fallback xmlns="">
           <p:sp>
             <p:nvSpPr>
               <p:cNvPr id="112" name="文本框 111">
@@ -5199,8 +5178,8 @@
           </p:sp>
         </mc:Fallback>
       </mc:AlternateContent>
-      <mc:AlternateContent xmlns:mc="http://schemas.openxmlformats.org/markup-compatibility/2006">
-        <mc:Choice xmlns:a14="http://schemas.microsoft.com/office/drawing/2010/main" Requires="a14">
+      <mc:AlternateContent xmlns:mc="http://schemas.openxmlformats.org/markup-compatibility/2006" xmlns:a14="http://schemas.microsoft.com/office/drawing/2010/main">
+        <mc:Choice Requires="a14">
           <p:sp>
             <p:nvSpPr>
               <p:cNvPr id="114" name="文本框 113">
@@ -5277,7 +5256,7 @@
             </p:txBody>
           </p:sp>
         </mc:Choice>
-        <mc:Fallback>
+        <mc:Fallback xmlns="">
           <p:sp>
             <p:nvSpPr>
               <p:cNvPr id="114" name="文本框 113">
@@ -5322,8 +5301,8 @@
           </p:sp>
         </mc:Fallback>
       </mc:AlternateContent>
-      <mc:AlternateContent xmlns:mc="http://schemas.openxmlformats.org/markup-compatibility/2006">
-        <mc:Choice xmlns:a14="http://schemas.microsoft.com/office/drawing/2010/main" Requires="a14">
+      <mc:AlternateContent xmlns:mc="http://schemas.openxmlformats.org/markup-compatibility/2006" xmlns:a14="http://schemas.microsoft.com/office/drawing/2010/main">
+        <mc:Choice Requires="a14">
           <p:sp>
             <p:nvSpPr>
               <p:cNvPr id="116" name="文本框 115">
@@ -5406,7 +5385,7 @@
             </p:txBody>
           </p:sp>
         </mc:Choice>
-        <mc:Fallback>
+        <mc:Fallback xmlns="">
           <p:sp>
             <p:nvSpPr>
               <p:cNvPr id="116" name="文本框 115">
@@ -6143,8 +6122,8 @@
           </a:p>
         </p:txBody>
       </p:sp>
-      <mc:AlternateContent xmlns:mc="http://schemas.openxmlformats.org/markup-compatibility/2006">
-        <mc:Choice xmlns:a14="http://schemas.microsoft.com/office/drawing/2010/main" Requires="a14">
+      <mc:AlternateContent xmlns:mc="http://schemas.openxmlformats.org/markup-compatibility/2006" xmlns:a14="http://schemas.microsoft.com/office/drawing/2010/main">
+        <mc:Choice Requires="a14">
           <p:sp>
             <p:nvSpPr>
               <p:cNvPr id="168" name="文本框 167">
@@ -6213,7 +6192,7 @@
             </p:txBody>
           </p:sp>
         </mc:Choice>
-        <mc:Fallback>
+        <mc:Fallback xmlns="">
           <p:sp>
             <p:nvSpPr>
               <p:cNvPr id="168" name="文本框 167">
@@ -6258,8 +6237,8 @@
           </p:sp>
         </mc:Fallback>
       </mc:AlternateContent>
-      <mc:AlternateContent xmlns:mc="http://schemas.openxmlformats.org/markup-compatibility/2006">
-        <mc:Choice xmlns:a14="http://schemas.microsoft.com/office/drawing/2010/main" Requires="a14">
+      <mc:AlternateContent xmlns:mc="http://schemas.openxmlformats.org/markup-compatibility/2006" xmlns:a14="http://schemas.microsoft.com/office/drawing/2010/main">
+        <mc:Choice Requires="a14">
           <p:sp>
             <p:nvSpPr>
               <p:cNvPr id="170" name="文本框 169">
@@ -6328,7 +6307,7 @@
             </p:txBody>
           </p:sp>
         </mc:Choice>
-        <mc:Fallback>
+        <mc:Fallback xmlns="">
           <p:sp>
             <p:nvSpPr>
               <p:cNvPr id="170" name="文本框 169">
@@ -7379,8 +7358,8 @@
           </a:p>
         </p:txBody>
       </p:sp>
-      <mc:AlternateContent xmlns:mc="http://schemas.openxmlformats.org/markup-compatibility/2006">
-        <mc:Choice xmlns:a14="http://schemas.microsoft.com/office/drawing/2010/main" Requires="a14">
+      <mc:AlternateContent xmlns:mc="http://schemas.openxmlformats.org/markup-compatibility/2006" xmlns:a14="http://schemas.microsoft.com/office/drawing/2010/main">
+        <mc:Choice Requires="a14">
           <p:sp>
             <p:nvSpPr>
               <p:cNvPr id="42" name="文本框 41">
@@ -7463,7 +7442,7 @@
             </p:txBody>
           </p:sp>
         </mc:Choice>
-        <mc:Fallback>
+        <mc:Fallback xmlns="">
           <p:sp>
             <p:nvSpPr>
               <p:cNvPr id="42" name="文本框 41">
@@ -7875,8 +7854,8 @@
           </a:p>
         </p:txBody>
       </p:sp>
-      <mc:AlternateContent xmlns:mc="http://schemas.openxmlformats.org/markup-compatibility/2006">
-        <mc:Choice xmlns:a14="http://schemas.microsoft.com/office/drawing/2010/main" Requires="a14">
+      <mc:AlternateContent xmlns:mc="http://schemas.openxmlformats.org/markup-compatibility/2006" xmlns:a14="http://schemas.microsoft.com/office/drawing/2010/main">
+        <mc:Choice Requires="a14">
           <p:sp>
             <p:nvSpPr>
               <p:cNvPr id="67" name="文本框 66">
@@ -7959,7 +7938,7 @@
             </p:txBody>
           </p:sp>
         </mc:Choice>
-        <mc:Fallback>
+        <mc:Fallback xmlns="">
           <p:sp>
             <p:nvSpPr>
               <p:cNvPr id="67" name="文本框 66">

</xml_diff>